<commit_message>
Wrong arrow direction in slides corrected
</commit_message>
<xml_diff>
--- a/docs/slides/Modelica2017-DAAE-Transformation.pptx
+++ b/docs/slides/Modelica2017-DAAE-Transformation.pptx
@@ -207,7 +207,7 @@
           <a:p>
             <a:fld id="{D7F4AE8B-A150-4820-BC27-EE42D733F4B8}" type="datetimeFigureOut">
               <a:rPr lang="en-GB" smtClean="0"/>
-              <a:t>28/05/2017</a:t>
+              <a:t>02/06/2017</a:t>
             </a:fld>
             <a:endParaRPr lang="en-GB"/>
           </a:p>
@@ -377,7 +377,7 @@
             <a:fld id="{45B75E70-762A-4375-AA7C-DE9BB7CC9339}" type="datetimeFigureOut">
               <a:rPr lang="de-DE" smtClean="0"/>
               <a:pPr/>
-              <a:t>28.05.2017</a:t>
+              <a:t>02.06.2017</a:t>
             </a:fld>
             <a:endParaRPr lang="de-DE" dirty="0"/>
           </a:p>
@@ -16043,7 +16043,8 @@
               <a:solidFill>
                 <a:srgbClr val="0000FF"/>
               </a:solidFill>
-              <a:tailEnd type="arrow"/>
+              <a:headEnd type="arrow" w="med" len="med"/>
+              <a:tailEnd type="none" w="med" len="med"/>
             </a:ln>
           </p:spPr>
           <p:style>
@@ -16551,8 +16552,8 @@
           <a:chExt cx="0" cy="0"/>
         </a:xfrm>
       </p:grpSpPr>
-      <mc:AlternateContent xmlns:mc="http://schemas.openxmlformats.org/markup-compatibility/2006">
-        <mc:Choice xmlns:a14="http://schemas.microsoft.com/office/drawing/2010/main" Requires="a14">
+      <mc:AlternateContent xmlns:mc="http://schemas.openxmlformats.org/markup-compatibility/2006" xmlns:a14="http://schemas.microsoft.com/office/drawing/2010/main">
+        <mc:Choice Requires="a14">
           <p:sp>
             <p:nvSpPr>
               <p:cNvPr id="2" name="Textplatzhalter 1"/>
@@ -16614,21 +16615,8 @@
                 </a:br>
                 <a:r>
                   <a:rPr lang="de-DE" smtClean="0"/>
-                  <a:t> see </a:t>
+                  <a:t> see companion paper „Innovations for future Modelica“).</a:t>
                 </a:r>
-                <a:r>
-                  <a:rPr lang="de-DE" smtClean="0"/>
-                  <a:t>companion paper „Innovations </a:t>
-                </a:r>
-                <a:r>
-                  <a:rPr lang="de-DE" smtClean="0"/>
-                  <a:t>for future </a:t>
-                </a:r>
-                <a:r>
-                  <a:rPr lang="de-DE" smtClean="0"/>
-                  <a:t>Modelica“).</a:t>
-                </a:r>
-                <a:endParaRPr lang="de-DE" smtClean="0"/>
               </a:p>
               <a:p>
                 <a:pPr>
@@ -16935,7 +16923,7 @@
             </p:txBody>
           </p:sp>
         </mc:Choice>
-        <mc:Fallback>
+        <mc:Fallback xmlns="">
           <p:sp>
             <p:nvSpPr>
               <p:cNvPr id="2" name="Textplatzhalter 1"/>
@@ -17647,15 +17635,7 @@
             </a:pPr>
             <a:r>
               <a:rPr lang="de-DE" smtClean="0"/>
-              <a:t>Large multi-body systems </a:t>
-            </a:r>
-            <a:r>
-              <a:rPr lang="de-DE" smtClean="0"/>
-              <a:t>with elastic </a:t>
-            </a:r>
-            <a:r>
-              <a:rPr lang="de-DE" smtClean="0"/>
-              <a:t>bodies and contacts</a:t>
+              <a:t>Large multi-body systems with elastic bodies and contacts</a:t>
             </a:r>
           </a:p>
           <a:p>
@@ -19090,17 +19070,7 @@
                 <a:latin typeface="Arial" pitchFamily="34" charset="0"/>
                 <a:cs typeface="Arial" pitchFamily="34" charset="0"/>
               </a:rPr>
-              <a:t>constraint </a:t>
-            </a:r>
-            <a:r>
-              <a:rPr lang="de-DE" sz="1400" smtClean="0">
-                <a:solidFill>
-                  <a:srgbClr val="777777"/>
-                </a:solidFill>
-                <a:latin typeface="Arial" pitchFamily="34" charset="0"/>
-                <a:cs typeface="Arial" pitchFamily="34" charset="0"/>
-              </a:rPr>
-              <a:t>structural</a:t>
+              <a:t>constraint structural</a:t>
             </a:r>
           </a:p>
           <a:p>
@@ -34739,11 +34709,7 @@
             </a:r>
             <a:r>
               <a:rPr lang="de-DE" smtClean="0"/>
-              <a:t>can be </a:t>
-            </a:r>
-            <a:r>
-              <a:rPr lang="de-DE" smtClean="0"/>
-              <a:t>applied,</a:t>
+              <a:t>can be applied,</a:t>
             </a:r>
             <a:br>
               <a:rPr lang="de-DE" smtClean="0"/>

</xml_diff>